<commit_message>
Finishing stylecop errors fixing. Some corrections and adding to the Refactoring Documentation.docx and presentation BORON-GameFifteen.pptx
</commit_message>
<xml_diff>
--- a/BORON-GameFifteen.pptx
+++ b/BORON-GameFifteen.pptx
@@ -113,7 +113,7 @@
   </p:defaultTextStyle>
   <p:extLst>
     <p:ext uri="{EFAFB233-063F-42B5-8137-9DF3F51BA10A}">
-      <p15:sldGuideLst xmlns:p15="http://schemas.microsoft.com/office/powerpoint/2012/main" xmlns=""/>
+      <p15:sldGuideLst xmlns="" xmlns:p15="http://schemas.microsoft.com/office/powerpoint/2012/main"/>
     </p:ext>
   </p:extLst>
 </p:presentation>
@@ -371,7 +371,7 @@
     </p:spTree>
     <p:extLst>
       <p:ext uri="{BB962C8B-B14F-4D97-AF65-F5344CB8AC3E}">
-        <p14:creationId xmlns="" xmlns:p14="http://schemas.microsoft.com/office/powerpoint/2010/main" val="693154640"/>
+        <p14:creationId xmlns:p14="http://schemas.microsoft.com/office/powerpoint/2010/main" xmlns="" val="693154640"/>
       </p:ext>
     </p:extLst>
   </p:cSld>
@@ -546,7 +546,7 @@
     </p:spTree>
     <p:extLst>
       <p:ext uri="{BB962C8B-B14F-4D97-AF65-F5344CB8AC3E}">
-        <p14:creationId xmlns="" xmlns:p14="http://schemas.microsoft.com/office/powerpoint/2010/main" val="2689348037"/>
+        <p14:creationId xmlns:p14="http://schemas.microsoft.com/office/powerpoint/2010/main" xmlns="" val="2689348037"/>
       </p:ext>
     </p:extLst>
   </p:cSld>
@@ -1145,7 +1145,7 @@
     </p:spTree>
     <p:extLst>
       <p:ext uri="{BB962C8B-B14F-4D97-AF65-F5344CB8AC3E}">
-        <p14:creationId xmlns="" xmlns:p14="http://schemas.microsoft.com/office/powerpoint/2010/main" val="111570418"/>
+        <p14:creationId xmlns:p14="http://schemas.microsoft.com/office/powerpoint/2010/main" xmlns="" val="111570418"/>
       </p:ext>
     </p:extLst>
   </p:cSld>
@@ -1450,7 +1450,7 @@
     </p:spTree>
     <p:extLst>
       <p:ext uri="{BB962C8B-B14F-4D97-AF65-F5344CB8AC3E}">
-        <p14:creationId xmlns="" xmlns:p14="http://schemas.microsoft.com/office/powerpoint/2010/main" val="2816610492"/>
+        <p14:creationId xmlns:p14="http://schemas.microsoft.com/office/powerpoint/2010/main" xmlns="" val="2816610492"/>
       </p:ext>
     </p:extLst>
   </p:cSld>
@@ -1881,7 +1881,7 @@
     </p:spTree>
     <p:extLst>
       <p:ext uri="{BB962C8B-B14F-4D97-AF65-F5344CB8AC3E}">
-        <p14:creationId xmlns="" xmlns:p14="http://schemas.microsoft.com/office/powerpoint/2010/main" val="1596569097"/>
+        <p14:creationId xmlns:p14="http://schemas.microsoft.com/office/powerpoint/2010/main" xmlns="" val="1596569097"/>
       </p:ext>
     </p:extLst>
   </p:cSld>
@@ -2048,7 +2048,7 @@
     </p:spTree>
     <p:extLst>
       <p:ext uri="{BB962C8B-B14F-4D97-AF65-F5344CB8AC3E}">
-        <p14:creationId xmlns="" xmlns:p14="http://schemas.microsoft.com/office/powerpoint/2010/main" val="2873234574"/>
+        <p14:creationId xmlns:p14="http://schemas.microsoft.com/office/powerpoint/2010/main" xmlns="" val="2873234574"/>
       </p:ext>
     </p:extLst>
   </p:cSld>
@@ -3602,7 +3602,7 @@
     </p:spTree>
     <p:extLst>
       <p:ext uri="{BB962C8B-B14F-4D97-AF65-F5344CB8AC3E}">
-        <p14:creationId xmlns="" xmlns:p14="http://schemas.microsoft.com/office/powerpoint/2010/main" val="3455503460"/>
+        <p14:creationId xmlns:p14="http://schemas.microsoft.com/office/powerpoint/2010/main" xmlns="" val="3455503460"/>
       </p:ext>
     </p:extLst>
   </p:cSld>
@@ -4759,7 +4759,7 @@
           <a:blip r:embed="rId26" cstate="print">
             <a:extLst>
               <a:ext uri="{28A0092B-C50C-407E-A947-70E740481C1C}">
-                <a14:useLocalDpi xmlns="" xmlns:a14="http://schemas.microsoft.com/office/drawing/2010/main" val="0"/>
+                <a14:useLocalDpi xmlns:a14="http://schemas.microsoft.com/office/drawing/2010/main" xmlns="" val="0"/>
               </a:ext>
             </a:extLst>
           </a:blip>
@@ -4779,7 +4779,7 @@
           <a:noFill/>
           <a:extLst>
             <a:ext uri="{909E8E84-426E-40DD-AFC4-6F175D3DCCD1}">
-              <a14:hiddenFill xmlns="" xmlns:a14="http://schemas.microsoft.com/office/drawing/2010/main">
+              <a14:hiddenFill xmlns:a14="http://schemas.microsoft.com/office/drawing/2010/main" xmlns="">
                 <a:solidFill>
                   <a:srgbClr val="FFFFFF"/>
                 </a:solidFill>
@@ -4800,7 +4800,7 @@
           <a:blip r:embed="rId27" cstate="email">
             <a:extLst>
               <a:ext uri="{28A0092B-C50C-407E-A947-70E740481C1C}">
-                <a14:useLocalDpi xmlns="" xmlns:a14="http://schemas.microsoft.com/office/drawing/2010/main"/>
+                <a14:useLocalDpi xmlns:a14="http://schemas.microsoft.com/office/drawing/2010/main" xmlns=""/>
               </a:ext>
             </a:extLst>
           </a:blip>
@@ -4824,14 +4824,14 @@
           <a:effectLst/>
           <a:extLst>
             <a:ext uri="{909E8E84-426E-40DD-AFC4-6F175D3DCCD1}">
-              <a14:hiddenFill xmlns="" xmlns:a14="http://schemas.microsoft.com/office/drawing/2010/main">
+              <a14:hiddenFill xmlns:a14="http://schemas.microsoft.com/office/drawing/2010/main" xmlns="">
                 <a:solidFill>
                   <a:schemeClr val="accent1"/>
                 </a:solidFill>
               </a14:hiddenFill>
             </a:ext>
             <a:ext uri="{91240B29-F687-4F45-9708-019B960494DF}">
-              <a14:hiddenLine xmlns="" xmlns:a14="http://schemas.microsoft.com/office/drawing/2010/main" w="9525">
+              <a14:hiddenLine xmlns:a14="http://schemas.microsoft.com/office/drawing/2010/main" xmlns="" w="9525">
                 <a:solidFill>
                   <a:schemeClr val="tx1"/>
                 </a:solidFill>
@@ -4841,7 +4841,7 @@
               </a14:hiddenLine>
             </a:ext>
             <a:ext uri="{AF507438-7753-43E0-B8FC-AC1667EBCBE1}">
-              <a14:hiddenEffects xmlns="" xmlns:a14="http://schemas.microsoft.com/office/drawing/2010/main">
+              <a14:hiddenEffects xmlns:a14="http://schemas.microsoft.com/office/drawing/2010/main" xmlns="">
                 <a:effectLst>
                   <a:outerShdw dist="35921" dir="2700000" algn="ctr" rotWithShape="0">
                     <a:schemeClr val="bg2"/>
@@ -4864,7 +4864,7 @@
           <a:blip r:embed="rId28" cstate="email">
             <a:extLst>
               <a:ext uri="{28A0092B-C50C-407E-A947-70E740481C1C}">
-                <a14:useLocalDpi xmlns="" xmlns:a14="http://schemas.microsoft.com/office/drawing/2010/main"/>
+                <a14:useLocalDpi xmlns:a14="http://schemas.microsoft.com/office/drawing/2010/main" xmlns=""/>
               </a:ext>
             </a:extLst>
           </a:blip>
@@ -4888,14 +4888,14 @@
           <a:effectLst/>
           <a:extLst>
             <a:ext uri="{909E8E84-426E-40DD-AFC4-6F175D3DCCD1}">
-              <a14:hiddenFill xmlns="" xmlns:a14="http://schemas.microsoft.com/office/drawing/2010/main">
+              <a14:hiddenFill xmlns:a14="http://schemas.microsoft.com/office/drawing/2010/main" xmlns="">
                 <a:solidFill>
                   <a:schemeClr val="accent1"/>
                 </a:solidFill>
               </a14:hiddenFill>
             </a:ext>
             <a:ext uri="{91240B29-F687-4F45-9708-019B960494DF}">
-              <a14:hiddenLine xmlns="" xmlns:a14="http://schemas.microsoft.com/office/drawing/2010/main" w="9525">
+              <a14:hiddenLine xmlns:a14="http://schemas.microsoft.com/office/drawing/2010/main" xmlns="" w="9525">
                 <a:solidFill>
                   <a:schemeClr val="tx1"/>
                 </a:solidFill>
@@ -4905,7 +4905,7 @@
               </a14:hiddenLine>
             </a:ext>
             <a:ext uri="{AF507438-7753-43E0-B8FC-AC1667EBCBE1}">
-              <a14:hiddenEffects xmlns="" xmlns:a14="http://schemas.microsoft.com/office/drawing/2010/main">
+              <a14:hiddenEffects xmlns:a14="http://schemas.microsoft.com/office/drawing/2010/main" xmlns="">
                 <a:effectLst>
                   <a:outerShdw dist="35921" dir="2700000" algn="ctr" rotWithShape="0">
                     <a:schemeClr val="bg2"/>
@@ -4928,7 +4928,7 @@
           <a:blip r:embed="rId29" cstate="print">
             <a:extLst>
               <a:ext uri="{BEBA8EAE-BF5A-486C-A8C5-ECC9F3942E4B}">
-                <a14:imgProps xmlns="" xmlns:a14="http://schemas.microsoft.com/office/drawing/2010/main">
+                <a14:imgProps xmlns:a14="http://schemas.microsoft.com/office/drawing/2010/main" xmlns="">
                   <a14:imgLayer r:embed="rId30">
                     <a14:imgEffect>
                       <a14:brightnessContrast bright="20000"/>
@@ -4937,7 +4937,7 @@
                 </a14:imgProps>
               </a:ext>
               <a:ext uri="{28A0092B-C50C-407E-A947-70E740481C1C}">
-                <a14:useLocalDpi xmlns="" xmlns:a14="http://schemas.microsoft.com/office/drawing/2010/main" val="0"/>
+                <a14:useLocalDpi xmlns:a14="http://schemas.microsoft.com/office/drawing/2010/main" xmlns="" val="0"/>
               </a:ext>
             </a:extLst>
           </a:blip>
@@ -4965,7 +4965,7 @@
           </a:effectLst>
           <a:extLst>
             <a:ext uri="{909E8E84-426E-40DD-AFC4-6F175D3DCCD1}">
-              <a14:hiddenFill xmlns="" xmlns:a14="http://schemas.microsoft.com/office/drawing/2010/main">
+              <a14:hiddenFill xmlns:a14="http://schemas.microsoft.com/office/drawing/2010/main" xmlns="">
                 <a:solidFill>
                   <a:srgbClr val="FFFFFF"/>
                 </a:solidFill>
@@ -4977,7 +4977,7 @@
     </p:spTree>
     <p:extLst>
       <p:ext uri="{BB962C8B-B14F-4D97-AF65-F5344CB8AC3E}">
-        <p14:creationId xmlns="" xmlns:p14="http://schemas.microsoft.com/office/powerpoint/2010/main" val="1290975174"/>
+        <p14:creationId xmlns:p14="http://schemas.microsoft.com/office/powerpoint/2010/main" xmlns="" val="1290975174"/>
       </p:ext>
     </p:extLst>
   </p:cSld>
@@ -5586,26 +5586,14 @@
             </a:br>
             <a:r>
               <a:rPr lang="en-US" sz="4000" dirty="0" smtClean="0"/>
-              <a:t>High-Quality </a:t>
-            </a:r>
-            <a:r>
-              <a:rPr lang="en-US" sz="4000" dirty="0" smtClean="0"/>
-              <a:t>Code Construction </a:t>
-            </a:r>
-            <a:r>
-              <a:rPr lang="en-US" sz="4000" dirty="0" smtClean="0"/>
-              <a:t/>
+              <a:t>High-Quality Code Construction </a:t>
             </a:r>
             <a:br>
               <a:rPr lang="en-US" sz="4000" dirty="0" smtClean="0"/>
             </a:br>
             <a:r>
               <a:rPr lang="en-US" sz="4000" dirty="0" smtClean="0"/>
-              <a:t> </a:t>
-            </a:r>
-            <a:r>
-              <a:rPr lang="en-US" sz="4000" dirty="0" smtClean="0"/>
-              <a:t>Team Projects – April 2013</a:t>
+              <a:t> Team Projects – April 2013</a:t>
             </a:r>
             <a:r>
               <a:rPr lang="bg-BG" dirty="0" smtClean="0"/>
@@ -5701,35 +5689,6 @@
       </p:sp>
       <p:sp>
         <p:nvSpPr>
-          <p:cNvPr id="8" name="Text Placeholder 7"/>
-          <p:cNvSpPr>
-            <a:spLocks noGrp="1"/>
-          </p:cNvSpPr>
-          <p:nvPr>
-            <p:ph type="body" sz="quarter" idx="12"/>
-          </p:nvPr>
-        </p:nvSpPr>
-        <p:spPr/>
-        <p:txBody>
-          <a:bodyPr/>
-          <a:lstStyle/>
-          <a:p>
-            <a:r>
-              <a:rPr lang="en-US" dirty="0" smtClean="0">
-                <a:hlinkClick r:id="rId3"/>
-              </a:rPr>
-              <a:t>html5course.telerik.com</a:t>
-            </a:r>
-            <a:r>
-              <a:rPr lang="en-US" dirty="0" smtClean="0"/>
-              <a:t> </a:t>
-            </a:r>
-            <a:endParaRPr lang="en-US" dirty="0"/>
-          </a:p>
-        </p:txBody>
-      </p:sp>
-      <p:sp>
-        <p:nvSpPr>
           <p:cNvPr id="9" name="Text Placeholder 8"/>
           <p:cNvSpPr>
             <a:spLocks noGrp="1"/>
@@ -5769,7 +5728,7 @@
           <p:nvPr/>
         </p:nvPicPr>
         <p:blipFill>
-          <a:blip r:embed="rId4" cstate="print"/>
+          <a:blip r:embed="rId3" cstate="print"/>
           <a:srcRect/>
           <a:stretch>
             <a:fillRect/>
@@ -5789,7 +5748,7 @@
     </p:spTree>
     <p:extLst>
       <p:ext uri="{BB962C8B-B14F-4D97-AF65-F5344CB8AC3E}">
-        <p14:creationId xmlns="" xmlns:p14="http://schemas.microsoft.com/office/powerpoint/2010/main" val="3762000528"/>
+        <p14:creationId xmlns:p14="http://schemas.microsoft.com/office/powerpoint/2010/main" xmlns="" val="3762000528"/>
       </p:ext>
     </p:extLst>
   </p:cSld>
@@ -5858,7 +5817,7 @@
           <a:blip r:embed="rId2" cstate="print">
             <a:extLst>
               <a:ext uri="{28A0092B-C50C-407E-A947-70E740481C1C}">
-                <a14:useLocalDpi xmlns="" xmlns:a14="http://schemas.microsoft.com/office/drawing/2010/main" val="0"/>
+                <a14:useLocalDpi xmlns:a14="http://schemas.microsoft.com/office/drawing/2010/main" xmlns="" val="0"/>
               </a:ext>
             </a:extLst>
           </a:blip>
@@ -5973,7 +5932,7 @@
         <p:spPr>
           <a:xfrm>
             <a:off x="3525919" y="1706508"/>
-            <a:ext cx="2152128" cy="461665"/>
+            <a:ext cx="2392001" cy="461665"/>
           </a:xfrm>
           <a:prstGeom prst="rect">
             <a:avLst/>
@@ -6017,7 +5976,22 @@
                   </a:outerShdw>
                 </a:effectLst>
               </a:rPr>
-              <a:t>Асен Георгиев</a:t>
+              <a:t>Асен </a:t>
+            </a:r>
+            <a:r>
+              <a:rPr lang="bg-BG" sz="2400" b="1" dirty="0" smtClean="0">
+                <a:solidFill>
+                  <a:srgbClr val="EBFFD2"/>
+                </a:solidFill>
+                <a:effectLst>
+                  <a:outerShdw blurRad="38100" dist="38100" dir="2700000" algn="tl">
+                    <a:srgbClr val="000000">
+                      <a:alpha val="43137"/>
+                    </a:srgbClr>
+                  </a:outerShdw>
+                </a:effectLst>
+              </a:rPr>
+              <a:t>Въльовски</a:t>
             </a:r>
             <a:endParaRPr lang="bg-BG" sz="2400" b="1" dirty="0">
               <a:solidFill>
@@ -6130,10 +6104,36 @@
           <a:noFill/>
         </p:spPr>
       </p:pic>
+      <p:pic>
+        <p:nvPicPr>
+          <p:cNvPr id="1026" name="Picture 2" descr="C:\Users\Asen\Desktop\1.jpg"/>
+          <p:cNvPicPr>
+            <a:picLocks noChangeAspect="1" noChangeArrowheads="1"/>
+          </p:cNvPicPr>
+          <p:nvPr/>
+        </p:nvPicPr>
+        <p:blipFill>
+          <a:blip r:embed="rId4" cstate="print"/>
+          <a:srcRect/>
+          <a:stretch>
+            <a:fillRect/>
+          </a:stretch>
+        </p:blipFill>
+        <p:spPr bwMode="auto">
+          <a:xfrm>
+            <a:off x="2078058" y="1542563"/>
+            <a:ext cx="855147" cy="808502"/>
+          </a:xfrm>
+          <a:prstGeom prst="rect">
+            <a:avLst/>
+          </a:prstGeom>
+          <a:noFill/>
+        </p:spPr>
+      </p:pic>
     </p:spTree>
     <p:extLst>
       <p:ext uri="{BB962C8B-B14F-4D97-AF65-F5344CB8AC3E}">
-        <p14:creationId xmlns="" xmlns:p14="http://schemas.microsoft.com/office/powerpoint/2010/main" val="2905109275"/>
+        <p14:creationId xmlns:p14="http://schemas.microsoft.com/office/powerpoint/2010/main" xmlns="" val="2905109275"/>
       </p:ext>
     </p:extLst>
   </p:cSld>
@@ -6207,120 +6207,96 @@
           <a:p>
             <a:r>
               <a:rPr lang="en-US" b="0" dirty="0" smtClean="0"/>
-              <a:t>All unneeded </a:t>
+              <a:t>Give appropriate name for the project, </a:t>
             </a:r>
             <a:r>
               <a:rPr lang="en-US" b="0" dirty="0" smtClean="0"/>
-              <a:t>empty </a:t>
+              <a:t>variables, fields, properties, methods and </a:t>
             </a:r>
             <a:r>
               <a:rPr lang="en-US" b="0" dirty="0" smtClean="0"/>
-              <a:t>lines has been removed.</a:t>
+              <a:t>classes.</a:t>
             </a:r>
             <a:endParaRPr lang="bg-BG" b="0" dirty="0" smtClean="0"/>
           </a:p>
           <a:p>
             <a:r>
               <a:rPr lang="en-US" b="0" dirty="0" smtClean="0"/>
-              <a:t>The curly brackets </a:t>
+              <a:t>Separate game </a:t>
             </a:r>
             <a:r>
               <a:rPr lang="en-US" b="0" dirty="0" smtClean="0"/>
-              <a:t>{ </a:t>
+              <a:t>project </a:t>
             </a:r>
             <a:r>
               <a:rPr lang="en-US" b="0" dirty="0" smtClean="0"/>
-              <a:t> and  } has been formatted  </a:t>
+              <a:t>into </a:t>
             </a:r>
             <a:r>
               <a:rPr lang="en-US" b="0" dirty="0" smtClean="0"/>
-              <a:t>according to </a:t>
-            </a:r>
+              <a:t>2 subprojects: UI and Library.</a:t>
+            </a:r>
+          </a:p>
+          <a:p>
             <a:r>
               <a:rPr lang="en-US" b="0" dirty="0" smtClean="0"/>
-              <a:t>the </a:t>
+              <a:t>Loose coupling between methods and </a:t>
             </a:r>
             <a:r>
               <a:rPr lang="en-US" b="0" dirty="0" smtClean="0"/>
-              <a:t>best practices for the C# language</a:t>
-            </a:r>
+              <a:t>classes.</a:t>
+            </a:r>
+          </a:p>
+          <a:p>
             <a:r>
               <a:rPr lang="en-US" b="0" dirty="0" smtClean="0"/>
-              <a:t>.</a:t>
+              <a:t>Reformatted the source </a:t>
+            </a:r>
+            <a:r>
+              <a:rPr lang="en-US" b="0" dirty="0" smtClean="0"/>
+              <a:t>code:</a:t>
+            </a:r>
+          </a:p>
+          <a:p>
+            <a:pPr lvl="1">
+              <a:buFont typeface="Wingdings" pitchFamily="2" charset="2"/>
+              <a:buChar char="Ø"/>
+            </a:pPr>
+            <a:r>
+              <a:rPr lang="en-US" b="0" dirty="0" smtClean="0"/>
+              <a:t>All unneeded empty lines has been removed.</a:t>
             </a:r>
             <a:endParaRPr lang="bg-BG" b="0" dirty="0" smtClean="0"/>
           </a:p>
           <a:p>
+            <a:pPr lvl="1">
+              <a:buFont typeface="Wingdings" pitchFamily="2" charset="2"/>
+              <a:buChar char="Ø"/>
+            </a:pPr>
             <a:r>
               <a:rPr lang="en-US" b="0" dirty="0" smtClean="0"/>
-              <a:t>Appropriate names for </a:t>
-            </a:r>
-            <a:r>
-              <a:rPr lang="en-US" b="0" dirty="0" smtClean="0"/>
-              <a:t>variables, fields</a:t>
-            </a:r>
-            <a:r>
-              <a:rPr lang="en-US" b="0" dirty="0" smtClean="0"/>
-              <a:t>, properties, </a:t>
-            </a:r>
-            <a:r>
-              <a:rPr lang="en-US" b="0" dirty="0" smtClean="0"/>
-              <a:t>methods and classes</a:t>
-            </a:r>
-            <a:r>
-              <a:rPr lang="bg-BG" b="0" dirty="0" smtClean="0"/>
-              <a:t> </a:t>
-            </a:r>
-            <a:r>
-              <a:rPr lang="en-US" b="0" dirty="0" smtClean="0"/>
-              <a:t>has been given</a:t>
-            </a:r>
-            <a:r>
-              <a:rPr lang="bg-BG" b="0" dirty="0" smtClean="0"/>
-              <a:t>.</a:t>
-            </a:r>
+              <a:t>The curly brackets {  and  } has been formatted  according to the best practices for the C# language.</a:t>
+            </a:r>
+            <a:endParaRPr lang="bg-BG" b="0" dirty="0" smtClean="0"/>
+          </a:p>
+          <a:p>
+            <a:pPr>
+              <a:buNone/>
+            </a:pPr>
             <a:endParaRPr lang="en-US" b="0" dirty="0" smtClean="0"/>
           </a:p>
           <a:p>
-            <a:r>
-              <a:rPr lang="en-US" b="0" dirty="0" smtClean="0"/>
-              <a:t>Duplicated </a:t>
-            </a:r>
-            <a:r>
-              <a:rPr lang="en-US" b="0" dirty="0" smtClean="0"/>
-              <a:t>code has </a:t>
-            </a:r>
-            <a:r>
-              <a:rPr lang="en-US" b="0" dirty="0" smtClean="0"/>
-              <a:t>been removed. </a:t>
-            </a:r>
             <a:endParaRPr lang="bg-BG" b="0" dirty="0" smtClean="0"/>
           </a:p>
           <a:p>
-            <a:r>
-              <a:rPr lang="en-US" b="0" dirty="0" smtClean="0"/>
-              <a:t> All </a:t>
-            </a:r>
-            <a:r>
-              <a:rPr lang="en-US" b="0" dirty="0" smtClean="0"/>
-              <a:t>constant </a:t>
-            </a:r>
-            <a:r>
-              <a:rPr lang="en-US" b="0" dirty="0" smtClean="0"/>
-              <a:t>fields has been renamed  </a:t>
-            </a:r>
-            <a:r>
-              <a:rPr lang="en-US" b="0" dirty="0" smtClean="0"/>
-              <a:t>using PascalCase instead of ALL_CAPS. </a:t>
-            </a:r>
-            <a:endParaRPr lang="en-US" b="0" dirty="0" smtClean="0"/>
+            <a:endParaRPr lang="bg-BG" b="0" dirty="0" smtClean="0"/>
           </a:p>
         </p:txBody>
       </p:sp>
     </p:spTree>
     <p:extLst>
       <p:ext uri="{BB962C8B-B14F-4D97-AF65-F5344CB8AC3E}">
-        <p14:creationId xmlns="" xmlns:p14="http://schemas.microsoft.com/office/powerpoint/2010/main" val="2206089877"/>
+        <p14:creationId xmlns:p14="http://schemas.microsoft.com/office/powerpoint/2010/main" xmlns="" val="2206089877"/>
       </p:ext>
     </p:extLst>
   </p:cSld>
@@ -6387,72 +6363,92 @@
             <p:ph idx="1"/>
           </p:nvPr>
         </p:nvSpPr>
-        <p:spPr/>
+        <p:spPr>
+          <a:xfrm>
+            <a:off x="95001" y="914400"/>
+            <a:ext cx="8965869" cy="5791200"/>
+          </a:xfrm>
+        </p:spPr>
         <p:txBody>
           <a:bodyPr/>
           <a:lstStyle/>
           <a:p>
             <a:r>
               <a:rPr lang="en-US" b="0" dirty="0" smtClean="0"/>
-              <a:t>Enumeration  members has been renamed from camelCase to PascalCase</a:t>
-            </a:r>
+              <a:t>Refactoring the code and fix some bugs and coupling between methods.</a:t>
+            </a:r>
+          </a:p>
+          <a:p>
             <a:r>
               <a:rPr lang="en-US" b="0" dirty="0" smtClean="0"/>
-              <a:t>.</a:t>
-            </a:r>
-          </a:p>
-          <a:p>
+              <a:t>Duplicated </a:t>
+            </a:r>
             <a:r>
               <a:rPr lang="en-US" b="0" dirty="0" smtClean="0"/>
-              <a:t>Unit tests for all methods has been added to ensure the </a:t>
-            </a:r>
+              <a:t>code has been removed. </a:t>
+            </a:r>
+            <a:endParaRPr lang="en-US" b="0" dirty="0" smtClean="0"/>
+          </a:p>
+          <a:p>
             <a:r>
               <a:rPr lang="en-US" b="0" dirty="0" smtClean="0"/>
-              <a:t>entire project functionality</a:t>
+              <a:t>Extracted and changing </a:t>
             </a:r>
             <a:r>
               <a:rPr lang="en-US" b="0" dirty="0" smtClean="0"/>
-              <a:t>.</a:t>
-            </a:r>
-          </a:p>
-          <a:p>
+              <a:t>method.</a:t>
+            </a:r>
+          </a:p>
+          <a:p>
+            <a:pPr lvl="0"/>
             <a:r>
               <a:rPr lang="en-US" b="0" dirty="0" smtClean="0"/>
-              <a:t>Code coverage </a:t>
+              <a:t>Adding XML </a:t>
             </a:r>
             <a:r>
               <a:rPr lang="en-US" b="0" dirty="0" smtClean="0"/>
-              <a:t>of the unit </a:t>
+              <a:t>Documentation headers </a:t>
             </a:r>
             <a:r>
               <a:rPr lang="en-US" b="0" dirty="0" smtClean="0"/>
-              <a:t>tests more than 90</a:t>
+              <a:t>to classes and </a:t>
             </a:r>
             <a:r>
               <a:rPr lang="en-US" b="0" dirty="0" smtClean="0"/>
-              <a:t>%. </a:t>
-            </a:r>
+              <a:t>all their methods, properties and constructors.</a:t>
+            </a:r>
+          </a:p>
+          <a:p>
+            <a:r>
+              <a:rPr lang="en-US" b="0" dirty="0" smtClean="0"/>
+              <a:t>Unit </a:t>
+            </a:r>
+            <a:r>
+              <a:rPr lang="en-US" b="0" dirty="0" smtClean="0"/>
+              <a:t>tests for all methods has been added to ensure the entire project functionality.</a:t>
+            </a:r>
+          </a:p>
+          <a:p>
+            <a:r>
+              <a:rPr lang="en-US" b="0" dirty="0" smtClean="0"/>
+              <a:t>Code coverage of the unit tests is 98%. </a:t>
+            </a:r>
+          </a:p>
+          <a:p>
             <a:endParaRPr lang="en-US" b="0" dirty="0" smtClean="0"/>
           </a:p>
           <a:p>
-            <a:r>
-              <a:rPr lang="en-US" b="0" dirty="0" smtClean="0"/>
-              <a:t>Game project separated into 2 subprojects: UI and Library.</a:t>
-            </a:r>
-          </a:p>
-          <a:p>
-            <a:r>
-              <a:rPr lang="en-US" b="0" dirty="0" smtClean="0"/>
-              <a:t>Loose coupling between methods and classes implemented.</a:t>
-            </a:r>
-            <a:endParaRPr lang="bg-BG" b="0" dirty="0"/>
+            <a:pPr>
+              <a:buNone/>
+            </a:pPr>
+            <a:endParaRPr lang="en-US" b="0" dirty="0" smtClean="0"/>
           </a:p>
         </p:txBody>
       </p:sp>
     </p:spTree>
     <p:extLst>
       <p:ext uri="{BB962C8B-B14F-4D97-AF65-F5344CB8AC3E}">
-        <p14:creationId xmlns="" xmlns:p14="http://schemas.microsoft.com/office/powerpoint/2010/main" val="4031379023"/>
+        <p14:creationId xmlns:p14="http://schemas.microsoft.com/office/powerpoint/2010/main" xmlns="" val="4031379023"/>
       </p:ext>
     </p:extLst>
   </p:cSld>
@@ -6634,7 +6630,7 @@
           <a:blip r:embed="rId2" cstate="print">
             <a:extLst>
               <a:ext uri="{28A0092B-C50C-407E-A947-70E740481C1C}">
-                <a14:useLocalDpi xmlns:a14="http://schemas.microsoft.com/office/drawing/2010/main" xmlns="" val="0"/>
+                <a14:useLocalDpi xmlns="" xmlns:a14="http://schemas.microsoft.com/office/drawing/2010/main" val="0"/>
               </a:ext>
             </a:extLst>
           </a:blip>
@@ -6663,7 +6659,7 @@
           </a:effectLst>
           <a:extLst>
             <a:ext uri="{909E8E84-426E-40DD-AFC4-6F175D3DCCD1}">
-              <a14:hiddenFill xmlns:a14="http://schemas.microsoft.com/office/drawing/2010/main" xmlns="">
+              <a14:hiddenFill xmlns="" xmlns:a14="http://schemas.microsoft.com/office/drawing/2010/main">
                 <a:solidFill>
                   <a:srgbClr val="FFFFFF"/>
                 </a:solidFill>
@@ -6675,7 +6671,7 @@
     </p:spTree>
     <p:extLst>
       <p:ext uri="{BB962C8B-B14F-4D97-AF65-F5344CB8AC3E}">
-        <p14:creationId xmlns="" xmlns:p14="http://schemas.microsoft.com/office/powerpoint/2010/main" val="1722661901"/>
+        <p14:creationId xmlns:p14="http://schemas.microsoft.com/office/powerpoint/2010/main" xmlns="" val="1722661901"/>
       </p:ext>
     </p:extLst>
   </p:cSld>
@@ -7264,7 +7260,7 @@
   <a:extraClrSchemeLst/>
   <a:extLst>
     <a:ext uri="{05A4C25C-085E-4340-85A3-A5531E510DB2}">
-      <thm15:themeFamily xmlns:thm15="http://schemas.microsoft.com/office/thememl/2012/main" xmlns="" name="Office Theme" id="{62F939B6-93AF-4DB8-9C6B-D6C7DFDC589F}" vid="{4A3C46E8-61CC-4603-A589-7422A47A8E4A}"/>
+      <thm15:themeFamily xmlns="" xmlns:thm15="http://schemas.microsoft.com/office/thememl/2012/main" name="Office Theme" id="{62F939B6-93AF-4DB8-9C6B-D6C7DFDC589F}" vid="{4A3C46E8-61CC-4603-A589-7422A47A8E4A}"/>
     </a:ext>
   </a:extLst>
 </a:theme>

</xml_diff>